<commit_message>
developing version.8 & add jemeters of other modules
</commit_message>
<xml_diff>
--- a/Bobby-MyRPC/Figures.pptx
+++ b/Bobby-MyRPC/Figures.pptx
@@ -261,7 +261,7 @@
           <a:p>
             <a:fld id="{178A2B6C-FC36-4AAD-B7F4-11174968DEAA}" type="datetimeFigureOut">
               <a:rPr lang="zh-CN" altLang="en-US" smtClean="0"/>
-              <a:t>2025/3/28</a:t>
+              <a:t>2025/3/29</a:t>
             </a:fld>
             <a:endParaRPr lang="zh-CN" altLang="en-US"/>
           </a:p>
@@ -459,7 +459,7 @@
           <a:p>
             <a:fld id="{178A2B6C-FC36-4AAD-B7F4-11174968DEAA}" type="datetimeFigureOut">
               <a:rPr lang="zh-CN" altLang="en-US" smtClean="0"/>
-              <a:t>2025/3/28</a:t>
+              <a:t>2025/3/29</a:t>
             </a:fld>
             <a:endParaRPr lang="zh-CN" altLang="en-US"/>
           </a:p>
@@ -667,7 +667,7 @@
           <a:p>
             <a:fld id="{178A2B6C-FC36-4AAD-B7F4-11174968DEAA}" type="datetimeFigureOut">
               <a:rPr lang="zh-CN" altLang="en-US" smtClean="0"/>
-              <a:t>2025/3/28</a:t>
+              <a:t>2025/3/29</a:t>
             </a:fld>
             <a:endParaRPr lang="zh-CN" altLang="en-US"/>
           </a:p>
@@ -865,7 +865,7 @@
           <a:p>
             <a:fld id="{178A2B6C-FC36-4AAD-B7F4-11174968DEAA}" type="datetimeFigureOut">
               <a:rPr lang="zh-CN" altLang="en-US" smtClean="0"/>
-              <a:t>2025/3/28</a:t>
+              <a:t>2025/3/29</a:t>
             </a:fld>
             <a:endParaRPr lang="zh-CN" altLang="en-US"/>
           </a:p>
@@ -1140,7 +1140,7 @@
           <a:p>
             <a:fld id="{178A2B6C-FC36-4AAD-B7F4-11174968DEAA}" type="datetimeFigureOut">
               <a:rPr lang="zh-CN" altLang="en-US" smtClean="0"/>
-              <a:t>2025/3/28</a:t>
+              <a:t>2025/3/29</a:t>
             </a:fld>
             <a:endParaRPr lang="zh-CN" altLang="en-US"/>
           </a:p>
@@ -1405,7 +1405,7 @@
           <a:p>
             <a:fld id="{178A2B6C-FC36-4AAD-B7F4-11174968DEAA}" type="datetimeFigureOut">
               <a:rPr lang="zh-CN" altLang="en-US" smtClean="0"/>
-              <a:t>2025/3/28</a:t>
+              <a:t>2025/3/29</a:t>
             </a:fld>
             <a:endParaRPr lang="zh-CN" altLang="en-US"/>
           </a:p>
@@ -1817,7 +1817,7 @@
           <a:p>
             <a:fld id="{178A2B6C-FC36-4AAD-B7F4-11174968DEAA}" type="datetimeFigureOut">
               <a:rPr lang="zh-CN" altLang="en-US" smtClean="0"/>
-              <a:t>2025/3/28</a:t>
+              <a:t>2025/3/29</a:t>
             </a:fld>
             <a:endParaRPr lang="zh-CN" altLang="en-US"/>
           </a:p>
@@ -1958,7 +1958,7 @@
           <a:p>
             <a:fld id="{178A2B6C-FC36-4AAD-B7F4-11174968DEAA}" type="datetimeFigureOut">
               <a:rPr lang="zh-CN" altLang="en-US" smtClean="0"/>
-              <a:t>2025/3/28</a:t>
+              <a:t>2025/3/29</a:t>
             </a:fld>
             <a:endParaRPr lang="zh-CN" altLang="en-US"/>
           </a:p>
@@ -2071,7 +2071,7 @@
           <a:p>
             <a:fld id="{178A2B6C-FC36-4AAD-B7F4-11174968DEAA}" type="datetimeFigureOut">
               <a:rPr lang="zh-CN" altLang="en-US" smtClean="0"/>
-              <a:t>2025/3/28</a:t>
+              <a:t>2025/3/29</a:t>
             </a:fld>
             <a:endParaRPr lang="zh-CN" altLang="en-US"/>
           </a:p>
@@ -2382,7 +2382,7 @@
           <a:p>
             <a:fld id="{178A2B6C-FC36-4AAD-B7F4-11174968DEAA}" type="datetimeFigureOut">
               <a:rPr lang="zh-CN" altLang="en-US" smtClean="0"/>
-              <a:t>2025/3/28</a:t>
+              <a:t>2025/3/29</a:t>
             </a:fld>
             <a:endParaRPr lang="zh-CN" altLang="en-US"/>
           </a:p>
@@ -2670,7 +2670,7 @@
           <a:p>
             <a:fld id="{178A2B6C-FC36-4AAD-B7F4-11174968DEAA}" type="datetimeFigureOut">
               <a:rPr lang="zh-CN" altLang="en-US" smtClean="0"/>
-              <a:t>2025/3/28</a:t>
+              <a:t>2025/3/29</a:t>
             </a:fld>
             <a:endParaRPr lang="zh-CN" altLang="en-US"/>
           </a:p>
@@ -2911,7 +2911,7 @@
           <a:p>
             <a:fld id="{178A2B6C-FC36-4AAD-B7F4-11174968DEAA}" type="datetimeFigureOut">
               <a:rPr lang="zh-CN" altLang="en-US" smtClean="0"/>
-              <a:t>2025/3/28</a:t>
+              <a:t>2025/3/29</a:t>
             </a:fld>
             <a:endParaRPr lang="zh-CN" altLang="en-US"/>
           </a:p>
@@ -5373,51 +5373,51 @@
       </p:grpSpPr>
       <p:sp>
         <p:nvSpPr>
-          <p:cNvPr id="2" name="标题 1">
-            <a:extLst>
-              <a:ext uri="{FF2B5EF4-FFF2-40B4-BE49-F238E27FC236}">
-                <a16:creationId xmlns:a16="http://schemas.microsoft.com/office/drawing/2014/main" id="{9FB39BA4-FA2F-4675-BF26-5885059E0995}"/>
-              </a:ext>
-            </a:extLst>
-          </p:cNvPr>
-          <p:cNvSpPr>
-            <a:spLocks noGrp="1"/>
-          </p:cNvSpPr>
-          <p:nvPr>
-            <p:ph type="title"/>
-          </p:nvPr>
-        </p:nvSpPr>
-        <p:spPr/>
-        <p:txBody>
-          <a:bodyPr/>
-          <a:lstStyle/>
-          <a:p>
-            <a:endParaRPr lang="en-US"/>
-          </a:p>
-        </p:txBody>
-      </p:sp>
-      <p:sp>
-        <p:nvSpPr>
-          <p:cNvPr id="3" name="内容占位符 2">
-            <a:extLst>
-              <a:ext uri="{FF2B5EF4-FFF2-40B4-BE49-F238E27FC236}">
-                <a16:creationId xmlns:a16="http://schemas.microsoft.com/office/drawing/2014/main" id="{AFA18C26-A6F9-446A-9FDA-EE7988811906}"/>
-              </a:ext>
-            </a:extLst>
-          </p:cNvPr>
-          <p:cNvSpPr>
-            <a:spLocks noGrp="1"/>
-          </p:cNvSpPr>
-          <p:nvPr>
-            <p:ph idx="1"/>
-          </p:nvPr>
-        </p:nvSpPr>
-        <p:spPr/>
-        <p:txBody>
-          <a:bodyPr/>
-          <a:lstStyle/>
-          <a:p>
-            <a:endParaRPr lang="en-US"/>
+          <p:cNvPr id="4" name="矩形: 圆角 3">
+            <a:extLst>
+              <a:ext uri="{FF2B5EF4-FFF2-40B4-BE49-F238E27FC236}">
+                <a16:creationId xmlns:a16="http://schemas.microsoft.com/office/drawing/2014/main" id="{9BCC9259-71F1-4BEA-8E67-8BE291CFC64B}"/>
+              </a:ext>
+            </a:extLst>
+          </p:cNvPr>
+          <p:cNvSpPr/>
+          <p:nvPr/>
+        </p:nvSpPr>
+        <p:spPr>
+          <a:xfrm>
+            <a:off x="548640" y="411480"/>
+            <a:ext cx="2135778" cy="842554"/>
+          </a:xfrm>
+          <a:prstGeom prst="roundRect">
+            <a:avLst/>
+          </a:prstGeom>
+        </p:spPr>
+        <p:style>
+          <a:lnRef idx="2">
+            <a:schemeClr val="accent1">
+              <a:shade val="50000"/>
+            </a:schemeClr>
+          </a:lnRef>
+          <a:fillRef idx="1">
+            <a:schemeClr val="accent1"/>
+          </a:fillRef>
+          <a:effectRef idx="0">
+            <a:schemeClr val="accent1"/>
+          </a:effectRef>
+          <a:fontRef idx="minor">
+            <a:schemeClr val="lt1"/>
+          </a:fontRef>
+        </p:style>
+        <p:txBody>
+          <a:bodyPr rtlCol="0" anchor="ctr"/>
+          <a:lstStyle/>
+          <a:p>
+            <a:pPr algn="ctr"/>
+            <a:r>
+              <a:rPr lang="en-US" altLang="zh-CN" dirty="0"/>
+              <a:t>@ServiceScan</a:t>
+            </a:r>
+            <a:endParaRPr lang="zh-CN" altLang="en-US" dirty="0"/>
           </a:p>
         </p:txBody>
       </p:sp>

</xml_diff>